<commit_message>
Correção typo na apresentação do notebook
</commit_message>
<xml_diff>
--- a/5 - doc2query/notebook/apresentacao_notebook_doc2query.pptx
+++ b/5 - doc2query/notebook/apresentacao_notebook_doc2query.pptx
@@ -10942,7 +10942,7 @@
                 <a:latin typeface="Arial" panose="020B0604020202020204" pitchFamily="34" charset="0"/>
                 <a:cs typeface="Arial" panose="020B0604020202020204" pitchFamily="34" charset="0"/>
               </a:rPr>
-              <a:t>Melhor nDCG@10 encontrando buscando parâmetros (k1, b) = (1.16, 0.42):</a:t>
+              <a:t>Melhor nDCG@10 encontrado buscando parâmetros k1, b</a:t>
             </a:r>
           </a:p>
         </p:txBody>
@@ -11044,8 +11044,8 @@
         </p:nvSpPr>
         <p:spPr>
           <a:xfrm>
-            <a:off x="398920" y="6266910"/>
-            <a:ext cx="11694252" cy="591090"/>
+            <a:off x="857250" y="6266910"/>
+            <a:ext cx="11235922" cy="591090"/>
           </a:xfrm>
           <a:prstGeom prst="rect">
             <a:avLst/>
@@ -11231,7 +11231,7 @@
                 <a:latin typeface="Arial" panose="020B0604020202020204" pitchFamily="34" charset="0"/>
                 <a:cs typeface="Arial" panose="020B0604020202020204" pitchFamily="34" charset="0"/>
               </a:rPr>
-              <a:t>nDCG@10 0.7081 (com expansão) e 0.6255 (sem expansão)</a:t>
+              <a:t>Para (k1, b) = (1.16, 0.42): 0.7081 (com expansão) e 0.6255 (sem expansão)</a:t>
             </a:r>
           </a:p>
         </p:txBody>
@@ -12184,6 +12184,15 @@
 </file>
 
 <file path=customXml/item1.xml><?xml version="1.0" encoding="utf-8"?>
+<?mso-contentType ?>
+<FormTemplates xmlns="http://schemas.microsoft.com/sharepoint/v3/contenttype/forms">
+  <Display>DocumentLibraryForm</Display>
+  <Edit>DocumentLibraryForm</Edit>
+  <New>DocumentLibraryForm</New>
+</FormTemplates>
+</file>
+
+<file path=customXml/item2.xml><?xml version="1.0" encoding="utf-8"?>
 <ct:contentTypeSchema xmlns:ct="http://schemas.microsoft.com/office/2006/metadata/contentType" xmlns:ma="http://schemas.microsoft.com/office/2006/metadata/properties/metaAttributes" ct:_="" ma:_="" ma:contentTypeName="Document" ma:contentTypeID="0x01010079F111ED35F8CC479449609E8A0923A6" ma:contentTypeVersion="21" ma:contentTypeDescription="Create a new document." ma:contentTypeScope="" ma:versionID="64dfb1555687e0874b4304b796b5b0c7">
   <xsd:schema xmlns:xsd="http://www.w3.org/2001/XMLSchema" xmlns:xs="http://www.w3.org/2001/XMLSchema" xmlns:p="http://schemas.microsoft.com/office/2006/metadata/properties" xmlns:ns1="http://schemas.microsoft.com/sharepoint/v3" xmlns:ns2="71af3243-3dd4-4a8d-8c0d-dd76da1f02a5" xmlns:ns3="16c05727-aa75-4e4a-9b5f-8a80a1165891" xmlns:ns4="230e9df3-be65-4c73-a93b-d1236ebd677e" targetNamespace="http://schemas.microsoft.com/office/2006/metadata/properties" ma:root="true" ma:fieldsID="e6e4c555b5e194d05b7203de9c4567b3" ns1:_="" ns2:_="" ns3:_="" ns4:_="">
     <xsd:import namespace="http://schemas.microsoft.com/sharepoint/v3"/>
@@ -12465,15 +12474,6 @@
 </ct:contentTypeSchema>
 </file>
 
-<file path=customXml/item2.xml><?xml version="1.0" encoding="utf-8"?>
-<?mso-contentType ?>
-<FormTemplates xmlns="http://schemas.microsoft.com/sharepoint/v3/contenttype/forms">
-  <Display>DocumentLibraryForm</Display>
-  <Edit>DocumentLibraryForm</Edit>
-  <New>DocumentLibraryForm</New>
-</FormTemplates>
-</file>
-
 <file path=customXml/item3.xml><?xml version="1.0" encoding="utf-8"?>
 <p:properties xmlns:p="http://schemas.microsoft.com/office/2006/metadata/properties" xmlns:xsi="http://www.w3.org/2001/XMLSchema-instance" xmlns:pc="http://schemas.microsoft.com/office/infopath/2007/PartnerControls">
   <documentManagement>
@@ -12494,6 +12494,14 @@
 </file>
 
 <file path=customXml/itemProps1.xml><?xml version="1.0" encoding="utf-8"?>
+<ds:datastoreItem xmlns:ds="http://schemas.openxmlformats.org/officeDocument/2006/customXml" ds:itemID="{E618C13B-9D83-4AF4-B64D-33362D5133F8}">
+  <ds:schemaRefs>
+    <ds:schemaRef ds:uri="http://schemas.microsoft.com/sharepoint/v3/contenttype/forms"/>
+  </ds:schemaRefs>
+</ds:datastoreItem>
+</file>
+
+<file path=customXml/itemProps2.xml><?xml version="1.0" encoding="utf-8"?>
 <ds:datastoreItem xmlns:ds="http://schemas.openxmlformats.org/officeDocument/2006/customXml" ds:itemID="{67ACD96E-49A0-4DA4-A7BB-AC2D8874213F}">
   <ds:schemaRefs>
     <ds:schemaRef ds:uri="http://schemas.microsoft.com/office/2006/metadata/contentType"/>
@@ -12510,14 +12518,6 @@
     <ds:schemaRef ds:uri="http://purl.org/dc/elements/1.1/"/>
     <ds:schemaRef ds:uri="http://purl.org/dc/terms/"/>
     <ds:schemaRef ds:uri="http://schemas.microsoft.com/internal/obd"/>
-  </ds:schemaRefs>
-</ds:datastoreItem>
-</file>
-
-<file path=customXml/itemProps2.xml><?xml version="1.0" encoding="utf-8"?>
-<ds:datastoreItem xmlns:ds="http://schemas.openxmlformats.org/officeDocument/2006/customXml" ds:itemID="{E618C13B-9D83-4AF4-B64D-33362D5133F8}">
-  <ds:schemaRefs>
-    <ds:schemaRef ds:uri="http://schemas.microsoft.com/sharepoint/v3/contenttype/forms"/>
   </ds:schemaRefs>
 </ds:datastoreItem>
 </file>

</xml_diff>